<commit_message>
Update for logs clearing feature
Signed-off-by: Hollow Man <hollowman@opensuse.org>
</commit_message>
<xml_diff>
--- a/slides.pptx
+++ b/slides.pptx
@@ -279,7 +279,7 @@
               <a:pPr>
                 <a:defRPr/>
               </a:pPr>
-              <a:t>11/18/2022</a:t>
+              <a:t>11/22/2022</a:t>
             </a:fld>
             <a:endParaRPr lang="fi-FI"/>
           </a:p>
@@ -470,7 +470,7 @@
               <a:pPr>
                 <a:defRPr/>
               </a:pPr>
-              <a:t>18.11.2022</a:t>
+              <a:t>22.11.2022</a:t>
             </a:fld>
             <a:endParaRPr lang="fi-FI"/>
           </a:p>
@@ -2477,7 +2477,7 @@
               <a:pPr>
                 <a:defRPr/>
               </a:pPr>
-              <a:t>18.11.2022</a:t>
+              <a:t>22.11.2022</a:t>
             </a:fld>
             <a:endParaRPr lang="fi-FI"/>
           </a:p>
@@ -2803,7 +2803,7 @@
               <a:pPr>
                 <a:defRPr/>
               </a:pPr>
-              <a:t>18.11.2022</a:t>
+              <a:t>22.11.2022</a:t>
             </a:fld>
             <a:endParaRPr lang="fi-FI"/>
           </a:p>
@@ -3129,7 +3129,7 @@
               <a:pPr>
                 <a:defRPr/>
               </a:pPr>
-              <a:t>18.11.2022</a:t>
+              <a:t>22.11.2022</a:t>
             </a:fld>
             <a:endParaRPr lang="fi-FI"/>
           </a:p>
@@ -3549,7 +3549,7 @@
               <a:pPr>
                 <a:defRPr/>
               </a:pPr>
-              <a:t>18.11.2022</a:t>
+              <a:t>22.11.2022</a:t>
             </a:fld>
             <a:endParaRPr lang="fi-FI"/>
           </a:p>
@@ -4208,7 +4208,7 @@
               <a:pPr>
                 <a:defRPr/>
               </a:pPr>
-              <a:t>18.11.2022</a:t>
+              <a:t>22.11.2022</a:t>
             </a:fld>
             <a:endParaRPr lang="fi-FI"/>
           </a:p>
@@ -4628,7 +4628,7 @@
               <a:pPr>
                 <a:defRPr/>
               </a:pPr>
-              <a:t>18.11.2022</a:t>
+              <a:t>22.11.2022</a:t>
             </a:fld>
             <a:endParaRPr lang="fi-FI"/>
           </a:p>
@@ -6744,7 +6744,7 @@
               <a:pPr>
                 <a:defRPr/>
               </a:pPr>
-              <a:t>18.11.2022</a:t>
+              <a:t>22.11.2022</a:t>
             </a:fld>
             <a:endParaRPr lang="fi-FI"/>
           </a:p>
@@ -7384,7 +7384,7 @@
               <a:pPr>
                 <a:defRPr/>
               </a:pPr>
-              <a:t>19.11.2022</a:t>
+              <a:t>22.11.2022</a:t>
             </a:fld>
             <a:endParaRPr lang="fi-FI"/>
           </a:p>
@@ -7613,7 +7613,7 @@
               <a:pPr>
                 <a:defRPr/>
               </a:pPr>
-              <a:t>19.11.2022</a:t>
+              <a:t>22.11.2022</a:t>
             </a:fld>
             <a:endParaRPr lang="fi-FI"/>
           </a:p>
@@ -7995,7 +7995,7 @@
               <a:pPr>
                 <a:defRPr/>
               </a:pPr>
-              <a:t>18.11.2022</a:t>
+              <a:t>22.11.2022</a:t>
             </a:fld>
             <a:endParaRPr lang="fi-FI"/>
           </a:p>
@@ -8155,7 +8155,7 @@
               <a:pPr>
                 <a:defRPr/>
               </a:pPr>
-              <a:t>18.11.2022</a:t>
+              <a:t>22.11.2022</a:t>
             </a:fld>
             <a:endParaRPr lang="fi-FI" dirty="0"/>
           </a:p>
@@ -8458,7 +8458,7 @@
               <a:pPr>
                 <a:defRPr/>
               </a:pPr>
-              <a:t>18.11.2022</a:t>
+              <a:t>22.11.2022</a:t>
             </a:fld>
             <a:endParaRPr lang="fi-FI"/>
           </a:p>
@@ -8661,7 +8661,7 @@
               <a:pPr>
                 <a:defRPr/>
               </a:pPr>
-              <a:t>18.11.2022</a:t>
+              <a:t>22.11.2022</a:t>
             </a:fld>
             <a:endParaRPr lang="fi-FI"/>
           </a:p>
@@ -8772,7 +8772,7 @@
               <a:pPr>
                 <a:defRPr/>
               </a:pPr>
-              <a:t>18.11.2022</a:t>
+              <a:t>22.11.2022</a:t>
             </a:fld>
             <a:endParaRPr lang="fi-FI"/>
           </a:p>
@@ -8913,7 +8913,7 @@
               <a:pPr>
                 <a:defRPr/>
               </a:pPr>
-              <a:t>18.11.2022</a:t>
+              <a:t>22.11.2022</a:t>
             </a:fld>
             <a:endParaRPr lang="fi-FI"/>
           </a:p>
@@ -9054,7 +9054,7 @@
               <a:pPr>
                 <a:defRPr/>
               </a:pPr>
-              <a:t>18.11.2022</a:t>
+              <a:t>22.11.2022</a:t>
             </a:fld>
             <a:endParaRPr lang="fi-FI"/>
           </a:p>
@@ -9195,7 +9195,7 @@
               <a:pPr>
                 <a:defRPr/>
               </a:pPr>
-              <a:t>18.11.2022</a:t>
+              <a:t>22.11.2022</a:t>
             </a:fld>
             <a:endParaRPr lang="fi-FI"/>
           </a:p>
@@ -9252,7 +9252,7 @@
         </p:blipFill>
         <p:spPr>
           <a:xfrm>
-            <a:off x="57137" y="1078141"/>
+            <a:off x="57137" y="1641473"/>
             <a:ext cx="5738567" cy="4104470"/>
           </a:xfrm>
           <a:prstGeom prst="rect">
@@ -9282,8 +9282,38 @@
         </p:blipFill>
         <p:spPr>
           <a:xfrm>
-            <a:off x="5363697" y="1078140"/>
+            <a:off x="5425422" y="1131837"/>
             <a:ext cx="6488084" cy="4104471"/>
+          </a:xfrm>
+          <a:prstGeom prst="rect">
+            <a:avLst/>
+          </a:prstGeom>
+        </p:spPr>
+      </p:pic>
+      <p:pic>
+        <p:nvPicPr>
+          <p:cNvPr id="8" name="Picture 7">
+            <a:extLst>
+              <a:ext uri="{FF2B5EF4-FFF2-40B4-BE49-F238E27FC236}">
+                <a16:creationId xmlns:a16="http://schemas.microsoft.com/office/drawing/2014/main" id="{7F1ABE11-FB8C-B77B-EECC-8A961D7FBC7D}"/>
+              </a:ext>
+            </a:extLst>
+          </p:cNvPr>
+          <p:cNvPicPr>
+            <a:picLocks noChangeAspect="1"/>
+          </p:cNvPicPr>
+          <p:nvPr/>
+        </p:nvPicPr>
+        <p:blipFill>
+          <a:blip r:embed="rId4"/>
+          <a:stretch>
+            <a:fillRect/>
+          </a:stretch>
+        </p:blipFill>
+        <p:spPr>
+          <a:xfrm>
+            <a:off x="1602421" y="983522"/>
+            <a:ext cx="2414407" cy="1186551"/>
           </a:xfrm>
           <a:prstGeom prst="rect">
             <a:avLst/>
@@ -9427,7 +9457,7 @@
               <a:pPr>
                 <a:defRPr/>
               </a:pPr>
-              <a:t>18.11.2022</a:t>
+              <a:t>22.11.2022</a:t>
             </a:fld>
             <a:endParaRPr lang="fi-FI"/>
           </a:p>
@@ -10047,7 +10077,7 @@
               <a:pPr>
                 <a:defRPr/>
               </a:pPr>
-              <a:t>18.11.2022</a:t>
+              <a:t>22.11.2022</a:t>
             </a:fld>
             <a:endParaRPr lang="fi-FI"/>
           </a:p>

</xml_diff>

<commit_message>
Update after advice session
Signed-off-by: Hollow Man <hollowman@opensuse.org>
</commit_message>
<xml_diff>
--- a/slides.pptx
+++ b/slides.pptx
@@ -279,7 +279,7 @@
               <a:pPr>
                 <a:defRPr/>
               </a:pPr>
-              <a:t>11/22/2022</a:t>
+              <a:t>11/25/2022</a:t>
             </a:fld>
             <a:endParaRPr lang="fi-FI"/>
           </a:p>
@@ -470,7 +470,7 @@
               <a:pPr>
                 <a:defRPr/>
               </a:pPr>
-              <a:t>22.11.2022</a:t>
+              <a:t>24.11.2022</a:t>
             </a:fld>
             <a:endParaRPr lang="fi-FI"/>
           </a:p>
@@ -2477,7 +2477,7 @@
               <a:pPr>
                 <a:defRPr/>
               </a:pPr>
-              <a:t>22.11.2022</a:t>
+              <a:t>24.11.2022</a:t>
             </a:fld>
             <a:endParaRPr lang="fi-FI"/>
           </a:p>
@@ -2803,7 +2803,7 @@
               <a:pPr>
                 <a:defRPr/>
               </a:pPr>
-              <a:t>22.11.2022</a:t>
+              <a:t>24.11.2022</a:t>
             </a:fld>
             <a:endParaRPr lang="fi-FI"/>
           </a:p>
@@ -3129,7 +3129,7 @@
               <a:pPr>
                 <a:defRPr/>
               </a:pPr>
-              <a:t>22.11.2022</a:t>
+              <a:t>24.11.2022</a:t>
             </a:fld>
             <a:endParaRPr lang="fi-FI"/>
           </a:p>
@@ -3549,7 +3549,7 @@
               <a:pPr>
                 <a:defRPr/>
               </a:pPr>
-              <a:t>22.11.2022</a:t>
+              <a:t>24.11.2022</a:t>
             </a:fld>
             <a:endParaRPr lang="fi-FI"/>
           </a:p>
@@ -4208,7 +4208,7 @@
               <a:pPr>
                 <a:defRPr/>
               </a:pPr>
-              <a:t>22.11.2022</a:t>
+              <a:t>24.11.2022</a:t>
             </a:fld>
             <a:endParaRPr lang="fi-FI"/>
           </a:p>
@@ -4628,7 +4628,7 @@
               <a:pPr>
                 <a:defRPr/>
               </a:pPr>
-              <a:t>22.11.2022</a:t>
+              <a:t>24.11.2022</a:t>
             </a:fld>
             <a:endParaRPr lang="fi-FI"/>
           </a:p>
@@ -6744,7 +6744,7 @@
               <a:pPr>
                 <a:defRPr/>
               </a:pPr>
-              <a:t>22.11.2022</a:t>
+              <a:t>24.11.2022</a:t>
             </a:fld>
             <a:endParaRPr lang="fi-FI"/>
           </a:p>
@@ -7384,7 +7384,7 @@
               <a:pPr>
                 <a:defRPr/>
               </a:pPr>
-              <a:t>22.11.2022</a:t>
+              <a:t>24.11.2022</a:t>
             </a:fld>
             <a:endParaRPr lang="fi-FI"/>
           </a:p>
@@ -7613,7 +7613,7 @@
               <a:pPr>
                 <a:defRPr/>
               </a:pPr>
-              <a:t>22.11.2022</a:t>
+              <a:t>24.11.2022</a:t>
             </a:fld>
             <a:endParaRPr lang="fi-FI"/>
           </a:p>
@@ -7909,7 +7909,7 @@
             </a:pPr>
             <a:r>
               <a:rPr lang="en-US" sz="2800" dirty="0"/>
-              <a:t>Hide API keys </a:t>
+              <a:t>Hide API master key </a:t>
             </a:r>
             <a:r>
               <a:rPr lang="en-US" altLang="zh-CN" sz="2800" dirty="0"/>
@@ -7917,7 +7917,7 @@
             </a:r>
             <a:r>
               <a:rPr lang="en-US" sz="2800" dirty="0"/>
-              <a:t>in the project</a:t>
+              <a:t>in the project and hard to find</a:t>
             </a:r>
             <a:endParaRPr lang="fi-FI" sz="2800" dirty="0"/>
           </a:p>
@@ -7931,7 +7931,7 @@
             </a:pPr>
             <a:r>
               <a:rPr lang="en-US" altLang="zh-CN" sz="2800" dirty="0"/>
-              <a:t>Use PBKDF2 as card key hash function</a:t>
+              <a:t>Use PBKDF2WithHmacSHA512 as subkey hash function</a:t>
             </a:r>
           </a:p>
           <a:p>
@@ -7943,8 +7943,12 @@
               <a:buChar char="•"/>
             </a:pPr>
             <a:r>
+              <a:rPr lang="en-US" altLang="zh-CN" sz="2800"/>
+              <a:t>Protect whole user </a:t>
+            </a:r>
+            <a:r>
               <a:rPr lang="en-US" altLang="zh-CN" sz="2800" dirty="0"/>
-              <a:t>Protect user memory from R/W without auth</a:t>
+              <a:t>memory from R/W without auth</a:t>
             </a:r>
           </a:p>
           <a:p>
@@ -7995,7 +7999,7 @@
               <a:pPr>
                 <a:defRPr/>
               </a:pPr>
-              <a:t>22.11.2022</a:t>
+              <a:t>24.11.2022</a:t>
             </a:fld>
             <a:endParaRPr lang="fi-FI"/>
           </a:p>
@@ -8155,7 +8159,7 @@
               <a:pPr>
                 <a:defRPr/>
               </a:pPr>
-              <a:t>22.11.2022</a:t>
+              <a:t>24.11.2022</a:t>
             </a:fld>
             <a:endParaRPr lang="fi-FI" dirty="0"/>
           </a:p>
@@ -8458,7 +8462,7 @@
               <a:pPr>
                 <a:defRPr/>
               </a:pPr>
-              <a:t>22.11.2022</a:t>
+              <a:t>24.11.2022</a:t>
             </a:fld>
             <a:endParaRPr lang="fi-FI"/>
           </a:p>
@@ -8632,7 +8636,7 @@
             </a:pPr>
             <a:r>
               <a:rPr lang="en-US" altLang="zh-CN" sz="2800" dirty="0"/>
-              <a:t>Admin view logs, block / unblock cards</a:t>
+              <a:t>Admin view / clear logs, block / unblock cards</a:t>
             </a:r>
             <a:endParaRPr lang="fi-FI" sz="2800" dirty="0"/>
           </a:p>
@@ -8661,7 +8665,7 @@
               <a:pPr>
                 <a:defRPr/>
               </a:pPr>
-              <a:t>22.11.2022</a:t>
+              <a:t>24.11.2022</a:t>
             </a:fld>
             <a:endParaRPr lang="fi-FI"/>
           </a:p>
@@ -8772,7 +8776,7 @@
               <a:pPr>
                 <a:defRPr/>
               </a:pPr>
-              <a:t>22.11.2022</a:t>
+              <a:t>24.11.2022</a:t>
             </a:fld>
             <a:endParaRPr lang="fi-FI"/>
           </a:p>
@@ -8913,7 +8917,7 @@
               <a:pPr>
                 <a:defRPr/>
               </a:pPr>
-              <a:t>22.11.2022</a:t>
+              <a:t>24.11.2022</a:t>
             </a:fld>
             <a:endParaRPr lang="fi-FI"/>
           </a:p>
@@ -9054,7 +9058,7 @@
               <a:pPr>
                 <a:defRPr/>
               </a:pPr>
-              <a:t>22.11.2022</a:t>
+              <a:t>24.11.2022</a:t>
             </a:fld>
             <a:endParaRPr lang="fi-FI"/>
           </a:p>
@@ -9195,7 +9199,7 @@
               <a:pPr>
                 <a:defRPr/>
               </a:pPr>
-              <a:t>22.11.2022</a:t>
+              <a:t>24.11.2022</a:t>
             </a:fld>
             <a:endParaRPr lang="fi-FI"/>
           </a:p>
@@ -9384,7 +9388,7 @@
         </p:nvSpPr>
         <p:spPr>
           <a:xfrm>
-            <a:off x="7178014" y="912835"/>
+            <a:off x="6833507" y="1080692"/>
             <a:ext cx="3799708" cy="1903844"/>
           </a:xfrm>
         </p:spPr>
@@ -9457,7 +9461,7 @@
               <a:pPr>
                 <a:defRPr/>
               </a:pPr>
-              <a:t>22.11.2022</a:t>
+              <a:t>24.11.2022</a:t>
             </a:fld>
             <a:endParaRPr lang="fi-FI"/>
           </a:p>
@@ -9508,8 +9512,8 @@
         </p:nvSpPr>
         <p:spPr>
           <a:xfrm>
-            <a:off x="751114" y="836816"/>
-            <a:ext cx="6310993" cy="4665913"/>
+            <a:off x="751115" y="836816"/>
+            <a:ext cx="5600700" cy="4878184"/>
           </a:xfrm>
           <a:prstGeom prst="rect">
             <a:avLst/>
@@ -9681,93 +9685,325 @@
             </a:r>
           </a:p>
           <a:p>
-            <a:pPr>
-              <a:lnSpc>
-                <a:spcPct val="150000"/>
-              </a:lnSpc>
-            </a:pPr>
-            <a:r>
-              <a:rPr lang="fi-FI" sz="2000" b="0" dirty="0"/>
-              <a:t>6 -&gt; max ride number (counter limit), expected counter</a:t>
-            </a:r>
-          </a:p>
-          <a:p>
-            <a:pPr>
-              <a:lnSpc>
-                <a:spcPct val="150000"/>
-              </a:lnSpc>
-            </a:pPr>
-            <a:r>
-              <a:rPr lang="fi-FI" sz="2000" b="0" dirty="0"/>
-              <a:t>7 -&gt; last check-in time</a:t>
-            </a:r>
-          </a:p>
-          <a:p>
-            <a:pPr>
-              <a:lnSpc>
-                <a:spcPct val="150000"/>
-              </a:lnSpc>
-            </a:pPr>
-            <a:r>
-              <a:rPr lang="fi-FI" sz="2000" b="0" dirty="0"/>
-              <a:t>8 -&gt; expiration time</a:t>
-            </a:r>
-          </a:p>
-          <a:p>
-            <a:pPr>
-              <a:lnSpc>
-                <a:spcPct val="150000"/>
-              </a:lnSpc>
-            </a:pPr>
-            <a:r>
-              <a:rPr lang="fi-FI" sz="2000" b="0" dirty="0"/>
-              <a:t>9 -&gt; hmac</a:t>
-            </a:r>
-          </a:p>
-          <a:p>
-            <a:pPr>
-              <a:lnSpc>
-                <a:spcPct val="150000"/>
-              </a:lnSpc>
-            </a:pPr>
-            <a:r>
-              <a:rPr lang="fi-FI" sz="2000" b="0" dirty="0"/>
-              <a:t>10 -&gt; max ride number (counter limit), expected counter</a:t>
-            </a:r>
-          </a:p>
-          <a:p>
-            <a:pPr>
-              <a:lnSpc>
-                <a:spcPct val="150000"/>
-              </a:lnSpc>
-            </a:pPr>
-            <a:r>
-              <a:rPr lang="fi-FI" sz="2000" b="0" dirty="0"/>
-              <a:t>11 -&gt; last check-in time</a:t>
-            </a:r>
-          </a:p>
-          <a:p>
-            <a:pPr>
-              <a:lnSpc>
-                <a:spcPct val="150000"/>
-              </a:lnSpc>
-            </a:pPr>
-            <a:r>
-              <a:rPr lang="fi-FI" sz="2000" b="0" dirty="0"/>
-              <a:t>12 -&gt; expiration time</a:t>
-            </a:r>
-          </a:p>
-          <a:p>
-            <a:pPr>
-              <a:lnSpc>
-                <a:spcPct val="150000"/>
-              </a:lnSpc>
-            </a:pPr>
-            <a:r>
-              <a:rPr lang="fi-FI" sz="2000" b="0" dirty="0"/>
-              <a:t>13 -&gt; hmac</a:t>
-            </a:r>
-            <a:endParaRPr lang="fi-FI" sz="2000" dirty="0"/>
+            <a:pPr algn="just"/>
+            <a:r>
+              <a:rPr lang="en-US" altLang="zh-CN" sz="2400" b="1" dirty="0">
+                <a:effectLst/>
+                <a:latin typeface="等线" panose="02010600030101010101" pitchFamily="2" charset="-122"/>
+                <a:ea typeface="等线" panose="02010600030101010101" pitchFamily="2" charset="-122"/>
+                <a:cs typeface="等线" panose="02010600030101010101" pitchFamily="2" charset="-122"/>
+              </a:rPr>
+              <a:t>6</a:t>
+            </a:r>
+            <a:r>
+              <a:rPr lang="en-US" altLang="zh-CN" sz="2400" dirty="0">
+                <a:effectLst/>
+                <a:latin typeface="等线" panose="02010600030101010101" pitchFamily="2" charset="-122"/>
+                <a:ea typeface="等线" panose="02010600030101010101" pitchFamily="2" charset="-122"/>
+                <a:cs typeface="等线" panose="02010600030101010101" pitchFamily="2" charset="-122"/>
+              </a:rPr>
+              <a:t>   -&gt; max ride number (counter limit)</a:t>
+            </a:r>
+            <a:endParaRPr lang="zh-CN" altLang="zh-CN" sz="2400" dirty="0">
+              <a:effectLst/>
+              <a:latin typeface="等线" panose="02010600030101010101" pitchFamily="2" charset="-122"/>
+              <a:ea typeface="等线" panose="02010600030101010101" pitchFamily="2" charset="-122"/>
+              <a:cs typeface="等线" panose="02010600030101010101" pitchFamily="2" charset="-122"/>
+            </a:endParaRPr>
+          </a:p>
+          <a:p>
+            <a:pPr algn="just"/>
+            <a:r>
+              <a:rPr lang="en-US" altLang="zh-CN" sz="2400" b="1" dirty="0">
+                <a:effectLst/>
+                <a:latin typeface="等线" panose="02010600030101010101" pitchFamily="2" charset="-122"/>
+                <a:ea typeface="等线" panose="02010600030101010101" pitchFamily="2" charset="-122"/>
+                <a:cs typeface="等线" panose="02010600030101010101" pitchFamily="2" charset="-122"/>
+              </a:rPr>
+              <a:t>7 </a:t>
+            </a:r>
+            <a:r>
+              <a:rPr lang="en-US" altLang="zh-CN" sz="2400" dirty="0">
+                <a:effectLst/>
+                <a:latin typeface="等线" panose="02010600030101010101" pitchFamily="2" charset="-122"/>
+                <a:ea typeface="等线" panose="02010600030101010101" pitchFamily="2" charset="-122"/>
+                <a:cs typeface="等线" panose="02010600030101010101" pitchFamily="2" charset="-122"/>
+              </a:rPr>
+              <a:t>  -&gt; initial counter, expected counter</a:t>
+            </a:r>
+            <a:endParaRPr lang="zh-CN" altLang="zh-CN" sz="2400" dirty="0">
+              <a:effectLst/>
+              <a:latin typeface="等线" panose="02010600030101010101" pitchFamily="2" charset="-122"/>
+              <a:ea typeface="等线" panose="02010600030101010101" pitchFamily="2" charset="-122"/>
+              <a:cs typeface="等线" panose="02010600030101010101" pitchFamily="2" charset="-122"/>
+            </a:endParaRPr>
+          </a:p>
+          <a:p>
+            <a:pPr algn="just"/>
+            <a:r>
+              <a:rPr lang="en-US" altLang="zh-CN" sz="2400" b="1" dirty="0">
+                <a:effectLst/>
+                <a:latin typeface="等线" panose="02010600030101010101" pitchFamily="2" charset="-122"/>
+                <a:ea typeface="等线" panose="02010600030101010101" pitchFamily="2" charset="-122"/>
+                <a:cs typeface="等线" panose="02010600030101010101" pitchFamily="2" charset="-122"/>
+              </a:rPr>
+              <a:t>8</a:t>
+            </a:r>
+            <a:r>
+              <a:rPr lang="en-US" altLang="zh-CN" sz="2400" dirty="0">
+                <a:effectLst/>
+                <a:latin typeface="等线" panose="02010600030101010101" pitchFamily="2" charset="-122"/>
+                <a:ea typeface="等线" panose="02010600030101010101" pitchFamily="2" charset="-122"/>
+                <a:cs typeface="等线" panose="02010600030101010101" pitchFamily="2" charset="-122"/>
+              </a:rPr>
+              <a:t>   -&gt; last check-in time</a:t>
+            </a:r>
+            <a:endParaRPr lang="zh-CN" altLang="zh-CN" sz="2400" dirty="0">
+              <a:effectLst/>
+              <a:latin typeface="等线" panose="02010600030101010101" pitchFamily="2" charset="-122"/>
+              <a:ea typeface="等线" panose="02010600030101010101" pitchFamily="2" charset="-122"/>
+              <a:cs typeface="等线" panose="02010600030101010101" pitchFamily="2" charset="-122"/>
+            </a:endParaRPr>
+          </a:p>
+          <a:p>
+            <a:pPr algn="just"/>
+            <a:r>
+              <a:rPr lang="en-US" altLang="zh-CN" sz="2400" b="1" dirty="0">
+                <a:effectLst/>
+                <a:latin typeface="等线" panose="02010600030101010101" pitchFamily="2" charset="-122"/>
+                <a:ea typeface="等线" panose="02010600030101010101" pitchFamily="2" charset="-122"/>
+                <a:cs typeface="等线" panose="02010600030101010101" pitchFamily="2" charset="-122"/>
+              </a:rPr>
+              <a:t>9</a:t>
+            </a:r>
+            <a:r>
+              <a:rPr lang="en-US" altLang="zh-CN" sz="2400" dirty="0">
+                <a:effectLst/>
+                <a:latin typeface="等线" panose="02010600030101010101" pitchFamily="2" charset="-122"/>
+                <a:ea typeface="等线" panose="02010600030101010101" pitchFamily="2" charset="-122"/>
+                <a:cs typeface="等线" panose="02010600030101010101" pitchFamily="2" charset="-122"/>
+              </a:rPr>
+              <a:t>   -&gt; expiration time</a:t>
+            </a:r>
+            <a:endParaRPr lang="zh-CN" altLang="zh-CN" sz="2400" dirty="0">
+              <a:effectLst/>
+              <a:latin typeface="等线" panose="02010600030101010101" pitchFamily="2" charset="-122"/>
+              <a:ea typeface="等线" panose="02010600030101010101" pitchFamily="2" charset="-122"/>
+              <a:cs typeface="等线" panose="02010600030101010101" pitchFamily="2" charset="-122"/>
+            </a:endParaRPr>
+          </a:p>
+          <a:p>
+            <a:pPr algn="just"/>
+            <a:r>
+              <a:rPr lang="en-US" altLang="zh-CN" sz="2400" b="1" dirty="0">
+                <a:effectLst/>
+                <a:latin typeface="等线" panose="02010600030101010101" pitchFamily="2" charset="-122"/>
+                <a:ea typeface="等线" panose="02010600030101010101" pitchFamily="2" charset="-122"/>
+                <a:cs typeface="等线" panose="02010600030101010101" pitchFamily="2" charset="-122"/>
+              </a:rPr>
+              <a:t>10</a:t>
+            </a:r>
+            <a:r>
+              <a:rPr lang="en-US" altLang="zh-CN" sz="2400" dirty="0">
+                <a:effectLst/>
+                <a:latin typeface="等线" panose="02010600030101010101" pitchFamily="2" charset="-122"/>
+                <a:ea typeface="等线" panose="02010600030101010101" pitchFamily="2" charset="-122"/>
+                <a:cs typeface="等线" panose="02010600030101010101" pitchFamily="2" charset="-122"/>
+              </a:rPr>
+              <a:t> -&gt; </a:t>
+            </a:r>
+            <a:r>
+              <a:rPr lang="en-US" altLang="zh-CN" sz="2400" dirty="0" err="1">
+                <a:effectLst/>
+                <a:latin typeface="等线" panose="02010600030101010101" pitchFamily="2" charset="-122"/>
+                <a:ea typeface="等线" panose="02010600030101010101" pitchFamily="2" charset="-122"/>
+                <a:cs typeface="等线" panose="02010600030101010101" pitchFamily="2" charset="-122"/>
+              </a:rPr>
+              <a:t>hmac</a:t>
+            </a:r>
+            <a:endParaRPr lang="zh-CN" altLang="zh-CN" sz="2400" dirty="0">
+              <a:effectLst/>
+              <a:latin typeface="等线" panose="02010600030101010101" pitchFamily="2" charset="-122"/>
+              <a:ea typeface="等线" panose="02010600030101010101" pitchFamily="2" charset="-122"/>
+              <a:cs typeface="等线" panose="02010600030101010101" pitchFamily="2" charset="-122"/>
+            </a:endParaRPr>
+          </a:p>
+          <a:p>
+            <a:pPr algn="just"/>
+            <a:r>
+              <a:rPr lang="en-US" altLang="zh-CN" sz="2400" b="1" dirty="0">
+                <a:solidFill>
+                  <a:srgbClr val="7F7F7F"/>
+                </a:solidFill>
+                <a:effectLst/>
+                <a:latin typeface="等线" panose="02010600030101010101" pitchFamily="2" charset="-122"/>
+                <a:ea typeface="等线" panose="02010600030101010101" pitchFamily="2" charset="-122"/>
+                <a:cs typeface="等线" panose="02010600030101010101" pitchFamily="2" charset="-122"/>
+              </a:rPr>
+              <a:t>11</a:t>
+            </a:r>
+            <a:r>
+              <a:rPr lang="en-US" altLang="zh-CN" sz="2400" dirty="0">
+                <a:solidFill>
+                  <a:srgbClr val="7F7F7F"/>
+                </a:solidFill>
+                <a:effectLst/>
+                <a:latin typeface="等线" panose="02010600030101010101" pitchFamily="2" charset="-122"/>
+                <a:ea typeface="等线" panose="02010600030101010101" pitchFamily="2" charset="-122"/>
+                <a:cs typeface="等线" panose="02010600030101010101" pitchFamily="2" charset="-122"/>
+              </a:rPr>
+              <a:t> -&gt; max ride number (counter limit)</a:t>
+            </a:r>
+            <a:endParaRPr lang="zh-CN" altLang="zh-CN" sz="2400" dirty="0">
+              <a:effectLst/>
+              <a:latin typeface="等线" panose="02010600030101010101" pitchFamily="2" charset="-122"/>
+              <a:ea typeface="等线" panose="02010600030101010101" pitchFamily="2" charset="-122"/>
+              <a:cs typeface="等线" panose="02010600030101010101" pitchFamily="2" charset="-122"/>
+            </a:endParaRPr>
+          </a:p>
+          <a:p>
+            <a:pPr algn="just"/>
+            <a:r>
+              <a:rPr lang="en-US" altLang="zh-CN" sz="2400" b="1" dirty="0">
+                <a:solidFill>
+                  <a:srgbClr val="7F7F7F"/>
+                </a:solidFill>
+                <a:effectLst/>
+                <a:latin typeface="等线" panose="02010600030101010101" pitchFamily="2" charset="-122"/>
+                <a:ea typeface="等线" panose="02010600030101010101" pitchFamily="2" charset="-122"/>
+                <a:cs typeface="等线" panose="02010600030101010101" pitchFamily="2" charset="-122"/>
+              </a:rPr>
+              <a:t>12</a:t>
+            </a:r>
+            <a:r>
+              <a:rPr lang="en-US" altLang="zh-CN" sz="2400" dirty="0">
+                <a:solidFill>
+                  <a:srgbClr val="7F7F7F"/>
+                </a:solidFill>
+                <a:effectLst/>
+                <a:latin typeface="等线" panose="02010600030101010101" pitchFamily="2" charset="-122"/>
+                <a:ea typeface="等线" panose="02010600030101010101" pitchFamily="2" charset="-122"/>
+                <a:cs typeface="等线" panose="02010600030101010101" pitchFamily="2" charset="-122"/>
+              </a:rPr>
+              <a:t> -&gt; initial counter, expected counter</a:t>
+            </a:r>
+            <a:endParaRPr lang="zh-CN" altLang="zh-CN" sz="2400" dirty="0">
+              <a:effectLst/>
+              <a:latin typeface="等线" panose="02010600030101010101" pitchFamily="2" charset="-122"/>
+              <a:ea typeface="等线" panose="02010600030101010101" pitchFamily="2" charset="-122"/>
+              <a:cs typeface="等线" panose="02010600030101010101" pitchFamily="2" charset="-122"/>
+            </a:endParaRPr>
+          </a:p>
+          <a:p>
+            <a:pPr algn="just"/>
+            <a:r>
+              <a:rPr lang="en-US" altLang="zh-CN" sz="2400" b="1" dirty="0">
+                <a:solidFill>
+                  <a:srgbClr val="7F7F7F"/>
+                </a:solidFill>
+                <a:effectLst/>
+                <a:latin typeface="等线" panose="02010600030101010101" pitchFamily="2" charset="-122"/>
+                <a:ea typeface="等线" panose="02010600030101010101" pitchFamily="2" charset="-122"/>
+                <a:cs typeface="等线" panose="02010600030101010101" pitchFamily="2" charset="-122"/>
+              </a:rPr>
+              <a:t>13</a:t>
+            </a:r>
+            <a:r>
+              <a:rPr lang="en-US" altLang="zh-CN" sz="2400" dirty="0">
+                <a:solidFill>
+                  <a:srgbClr val="7F7F7F"/>
+                </a:solidFill>
+                <a:effectLst/>
+                <a:latin typeface="等线" panose="02010600030101010101" pitchFamily="2" charset="-122"/>
+                <a:ea typeface="等线" panose="02010600030101010101" pitchFamily="2" charset="-122"/>
+                <a:cs typeface="等线" panose="02010600030101010101" pitchFamily="2" charset="-122"/>
+              </a:rPr>
+              <a:t> -&gt; last check-in time</a:t>
+            </a:r>
+            <a:endParaRPr lang="zh-CN" altLang="zh-CN" sz="2400" dirty="0">
+              <a:effectLst/>
+              <a:latin typeface="等线" panose="02010600030101010101" pitchFamily="2" charset="-122"/>
+              <a:ea typeface="等线" panose="02010600030101010101" pitchFamily="2" charset="-122"/>
+              <a:cs typeface="等线" panose="02010600030101010101" pitchFamily="2" charset="-122"/>
+            </a:endParaRPr>
+          </a:p>
+          <a:p>
+            <a:pPr algn="just"/>
+            <a:r>
+              <a:rPr lang="en-US" altLang="zh-CN" sz="2400" b="1" dirty="0">
+                <a:solidFill>
+                  <a:srgbClr val="7F7F7F"/>
+                </a:solidFill>
+                <a:effectLst/>
+                <a:latin typeface="等线" panose="02010600030101010101" pitchFamily="2" charset="-122"/>
+                <a:ea typeface="等线" panose="02010600030101010101" pitchFamily="2" charset="-122"/>
+                <a:cs typeface="等线" panose="02010600030101010101" pitchFamily="2" charset="-122"/>
+              </a:rPr>
+              <a:t>14</a:t>
+            </a:r>
+            <a:r>
+              <a:rPr lang="en-US" altLang="zh-CN" sz="2400" dirty="0">
+                <a:solidFill>
+                  <a:srgbClr val="7F7F7F"/>
+                </a:solidFill>
+                <a:effectLst/>
+                <a:latin typeface="等线" panose="02010600030101010101" pitchFamily="2" charset="-122"/>
+                <a:ea typeface="等线" panose="02010600030101010101" pitchFamily="2" charset="-122"/>
+                <a:cs typeface="等线" panose="02010600030101010101" pitchFamily="2" charset="-122"/>
+              </a:rPr>
+              <a:t> -&gt; expiration time</a:t>
+            </a:r>
+            <a:endParaRPr lang="zh-CN" altLang="zh-CN" sz="2400" dirty="0">
+              <a:effectLst/>
+              <a:latin typeface="等线" panose="02010600030101010101" pitchFamily="2" charset="-122"/>
+              <a:ea typeface="等线" panose="02010600030101010101" pitchFamily="2" charset="-122"/>
+              <a:cs typeface="等线" panose="02010600030101010101" pitchFamily="2" charset="-122"/>
+            </a:endParaRPr>
+          </a:p>
+          <a:p>
+            <a:pPr algn="just"/>
+            <a:r>
+              <a:rPr lang="en-US" altLang="zh-CN" sz="2400" b="1" dirty="0">
+                <a:solidFill>
+                  <a:srgbClr val="7F7F7F"/>
+                </a:solidFill>
+                <a:effectLst/>
+                <a:latin typeface="等线" panose="02010600030101010101" pitchFamily="2" charset="-122"/>
+                <a:ea typeface="等线" panose="02010600030101010101" pitchFamily="2" charset="-122"/>
+                <a:cs typeface="等线" panose="02010600030101010101" pitchFamily="2" charset="-122"/>
+              </a:rPr>
+              <a:t>15</a:t>
+            </a:r>
+            <a:r>
+              <a:rPr lang="en-US" altLang="zh-CN" sz="2400" dirty="0">
+                <a:solidFill>
+                  <a:srgbClr val="7F7F7F"/>
+                </a:solidFill>
+                <a:effectLst/>
+                <a:latin typeface="等线" panose="02010600030101010101" pitchFamily="2" charset="-122"/>
+                <a:ea typeface="等线" panose="02010600030101010101" pitchFamily="2" charset="-122"/>
+                <a:cs typeface="等线" panose="02010600030101010101" pitchFamily="2" charset="-122"/>
+              </a:rPr>
+              <a:t> -&gt; </a:t>
+            </a:r>
+            <a:r>
+              <a:rPr lang="en-US" altLang="zh-CN" sz="2400" dirty="0" err="1">
+                <a:solidFill>
+                  <a:srgbClr val="7F7F7F"/>
+                </a:solidFill>
+                <a:effectLst/>
+                <a:latin typeface="等线" panose="02010600030101010101" pitchFamily="2" charset="-122"/>
+                <a:ea typeface="等线" panose="02010600030101010101" pitchFamily="2" charset="-122"/>
+                <a:cs typeface="等线" panose="02010600030101010101" pitchFamily="2" charset="-122"/>
+              </a:rPr>
+              <a:t>hmac</a:t>
+            </a:r>
+            <a:endParaRPr lang="zh-CN" altLang="zh-CN" sz="2400" dirty="0">
+              <a:effectLst/>
+              <a:latin typeface="等线" panose="02010600030101010101" pitchFamily="2" charset="-122"/>
+              <a:ea typeface="等线" panose="02010600030101010101" pitchFamily="2" charset="-122"/>
+              <a:cs typeface="等线" panose="02010600030101010101" pitchFamily="2" charset="-122"/>
+            </a:endParaRPr>
           </a:p>
         </p:txBody>
       </p:sp>
@@ -9787,8 +10023,8 @@
         </p:nvSpPr>
         <p:spPr>
           <a:xfrm>
-            <a:off x="7178014" y="3305021"/>
-            <a:ext cx="4702836" cy="2067080"/>
+            <a:off x="6833507" y="2988536"/>
+            <a:ext cx="5047343" cy="2305203"/>
           </a:xfrm>
           <a:prstGeom prst="rect">
             <a:avLst/>
@@ -9960,45 +10196,139 @@
             </a:r>
           </a:p>
           <a:p>
-            <a:pPr>
-              <a:lnSpc>
-                <a:spcPct val="150000"/>
-              </a:lnSpc>
-            </a:pPr>
-            <a:r>
-              <a:rPr lang="fi-FI" sz="2000" b="0" dirty="0"/>
-              <a:t>34,35 -&gt; timestamp, remaining ride, type</a:t>
-            </a:r>
-          </a:p>
-          <a:p>
-            <a:pPr>
-              <a:lnSpc>
-                <a:spcPct val="150000"/>
-              </a:lnSpc>
-            </a:pPr>
-            <a:r>
-              <a:rPr lang="fi-FI" sz="2000" b="0" dirty="0"/>
-              <a:t>36,37 -&gt; timestamp, remaining ride, type</a:t>
-            </a:r>
-          </a:p>
-          <a:p>
-            <a:pPr>
-              <a:lnSpc>
-                <a:spcPct val="150000"/>
-              </a:lnSpc>
-            </a:pPr>
-            <a:r>
-              <a:rPr lang="fi-FI" sz="2000" b="0" dirty="0"/>
-              <a:t>38,39 -&gt; timestamp, remaining ride, type</a:t>
-            </a:r>
-          </a:p>
-          <a:p>
-            <a:pPr>
-              <a:lnSpc>
-                <a:spcPct val="150000"/>
-              </a:lnSpc>
-            </a:pPr>
-            <a:endParaRPr lang="fi-FI" sz="2000" dirty="0"/>
+            <a:pPr algn="just"/>
+            <a:r>
+              <a:rPr lang="en-US" altLang="zh-CN" sz="2000" b="1" dirty="0">
+                <a:effectLst/>
+                <a:latin typeface="等线" panose="02010600030101010101" pitchFamily="2" charset="-122"/>
+                <a:ea typeface="等线" panose="02010600030101010101" pitchFamily="2" charset="-122"/>
+                <a:cs typeface="等线" panose="02010600030101010101" pitchFamily="2" charset="-122"/>
+              </a:rPr>
+              <a:t>30,31 </a:t>
+            </a:r>
+            <a:r>
+              <a:rPr lang="en-US" altLang="zh-CN" sz="2000" dirty="0">
+                <a:effectLst/>
+                <a:latin typeface="等线" panose="02010600030101010101" pitchFamily="2" charset="-122"/>
+                <a:ea typeface="等线" panose="02010600030101010101" pitchFamily="2" charset="-122"/>
+                <a:cs typeface="等线" panose="02010600030101010101" pitchFamily="2" charset="-122"/>
+              </a:rPr>
+              <a:t>-&gt; timestamp, remaining ride, type</a:t>
+            </a:r>
+            <a:endParaRPr lang="zh-CN" altLang="zh-CN" sz="2000" dirty="0">
+              <a:effectLst/>
+              <a:latin typeface="等线" panose="02010600030101010101" pitchFamily="2" charset="-122"/>
+              <a:ea typeface="等线" panose="02010600030101010101" pitchFamily="2" charset="-122"/>
+              <a:cs typeface="等线" panose="02010600030101010101" pitchFamily="2" charset="-122"/>
+            </a:endParaRPr>
+          </a:p>
+          <a:p>
+            <a:pPr algn="just"/>
+            <a:r>
+              <a:rPr lang="en-US" altLang="zh-CN" sz="2000" b="1" dirty="0">
+                <a:effectLst/>
+                <a:latin typeface="等线" panose="02010600030101010101" pitchFamily="2" charset="-122"/>
+                <a:ea typeface="等线" panose="02010600030101010101" pitchFamily="2" charset="-122"/>
+                <a:cs typeface="等线" panose="02010600030101010101" pitchFamily="2" charset="-122"/>
+              </a:rPr>
+              <a:t>32,33</a:t>
+            </a:r>
+            <a:r>
+              <a:rPr lang="en-US" altLang="zh-CN" sz="2000" dirty="0">
+                <a:effectLst/>
+                <a:latin typeface="等线" panose="02010600030101010101" pitchFamily="2" charset="-122"/>
+                <a:ea typeface="等线" panose="02010600030101010101" pitchFamily="2" charset="-122"/>
+                <a:cs typeface="等线" panose="02010600030101010101" pitchFamily="2" charset="-122"/>
+              </a:rPr>
+              <a:t> -&gt; timestamp, remaining ride, type</a:t>
+            </a:r>
+            <a:endParaRPr lang="zh-CN" altLang="zh-CN" sz="2000" dirty="0">
+              <a:effectLst/>
+              <a:latin typeface="等线" panose="02010600030101010101" pitchFamily="2" charset="-122"/>
+              <a:ea typeface="等线" panose="02010600030101010101" pitchFamily="2" charset="-122"/>
+              <a:cs typeface="等线" panose="02010600030101010101" pitchFamily="2" charset="-122"/>
+            </a:endParaRPr>
+          </a:p>
+          <a:p>
+            <a:pPr algn="just"/>
+            <a:r>
+              <a:rPr lang="en-US" altLang="zh-CN" sz="2000" b="1" dirty="0">
+                <a:effectLst/>
+                <a:latin typeface="等线" panose="02010600030101010101" pitchFamily="2" charset="-122"/>
+                <a:ea typeface="等线" panose="02010600030101010101" pitchFamily="2" charset="-122"/>
+                <a:cs typeface="等线" panose="02010600030101010101" pitchFamily="2" charset="-122"/>
+              </a:rPr>
+              <a:t>34,35</a:t>
+            </a:r>
+            <a:r>
+              <a:rPr lang="en-US" altLang="zh-CN" sz="2000" dirty="0">
+                <a:effectLst/>
+                <a:latin typeface="等线" panose="02010600030101010101" pitchFamily="2" charset="-122"/>
+                <a:ea typeface="等线" panose="02010600030101010101" pitchFamily="2" charset="-122"/>
+                <a:cs typeface="等线" panose="02010600030101010101" pitchFamily="2" charset="-122"/>
+              </a:rPr>
+              <a:t> -&gt; timestamp, remaining ride, type</a:t>
+            </a:r>
+            <a:endParaRPr lang="zh-CN" altLang="zh-CN" sz="2000" dirty="0">
+              <a:effectLst/>
+              <a:latin typeface="等线" panose="02010600030101010101" pitchFamily="2" charset="-122"/>
+              <a:ea typeface="等线" panose="02010600030101010101" pitchFamily="2" charset="-122"/>
+              <a:cs typeface="等线" panose="02010600030101010101" pitchFamily="2" charset="-122"/>
+            </a:endParaRPr>
+          </a:p>
+          <a:p>
+            <a:pPr algn="just"/>
+            <a:r>
+              <a:rPr lang="en-US" altLang="zh-CN" sz="2000" b="1" dirty="0">
+                <a:effectLst/>
+                <a:latin typeface="等线" panose="02010600030101010101" pitchFamily="2" charset="-122"/>
+                <a:ea typeface="等线" panose="02010600030101010101" pitchFamily="2" charset="-122"/>
+                <a:cs typeface="等线" panose="02010600030101010101" pitchFamily="2" charset="-122"/>
+              </a:rPr>
+              <a:t>36,37</a:t>
+            </a:r>
+            <a:r>
+              <a:rPr lang="en-US" altLang="zh-CN" sz="2000" dirty="0">
+                <a:effectLst/>
+                <a:latin typeface="等线" panose="02010600030101010101" pitchFamily="2" charset="-122"/>
+                <a:ea typeface="等线" panose="02010600030101010101" pitchFamily="2" charset="-122"/>
+                <a:cs typeface="等线" panose="02010600030101010101" pitchFamily="2" charset="-122"/>
+              </a:rPr>
+              <a:t> -&gt; timestamp, remaining ride, type</a:t>
+            </a:r>
+            <a:endParaRPr lang="zh-CN" altLang="zh-CN" sz="2000" dirty="0">
+              <a:effectLst/>
+              <a:latin typeface="等线" panose="02010600030101010101" pitchFamily="2" charset="-122"/>
+              <a:ea typeface="等线" panose="02010600030101010101" pitchFamily="2" charset="-122"/>
+              <a:cs typeface="等线" panose="02010600030101010101" pitchFamily="2" charset="-122"/>
+            </a:endParaRPr>
+          </a:p>
+          <a:p>
+            <a:pPr algn="just"/>
+            <a:r>
+              <a:rPr lang="en-US" altLang="zh-CN" sz="2000" b="1" dirty="0">
+                <a:effectLst/>
+                <a:latin typeface="等线" panose="02010600030101010101" pitchFamily="2" charset="-122"/>
+                <a:ea typeface="等线" panose="02010600030101010101" pitchFamily="2" charset="-122"/>
+                <a:cs typeface="等线" panose="02010600030101010101" pitchFamily="2" charset="-122"/>
+              </a:rPr>
+              <a:t>38,39</a:t>
+            </a:r>
+            <a:r>
+              <a:rPr lang="en-US" altLang="zh-CN" sz="2000" dirty="0">
+                <a:effectLst/>
+                <a:latin typeface="等线" panose="02010600030101010101" pitchFamily="2" charset="-122"/>
+                <a:ea typeface="等线" panose="02010600030101010101" pitchFamily="2" charset="-122"/>
+                <a:cs typeface="等线" panose="02010600030101010101" pitchFamily="2" charset="-122"/>
+              </a:rPr>
+              <a:t> -&gt; timestamp, remaining ride, type</a:t>
+            </a:r>
+            <a:endParaRPr lang="zh-CN" altLang="zh-CN" sz="2000" dirty="0">
+              <a:effectLst/>
+              <a:latin typeface="等线" panose="02010600030101010101" pitchFamily="2" charset="-122"/>
+              <a:ea typeface="等线" panose="02010600030101010101" pitchFamily="2" charset="-122"/>
+              <a:cs typeface="等线" panose="02010600030101010101" pitchFamily="2" charset="-122"/>
+            </a:endParaRPr>
           </a:p>
         </p:txBody>
       </p:sp>
@@ -10077,7 +10407,7 @@
               <a:pPr>
                 <a:defRPr/>
               </a:pPr>
-              <a:t>22.11.2022</a:t>
+              <a:t>24.11.2022</a:t>
             </a:fld>
             <a:endParaRPr lang="fi-FI"/>
           </a:p>

</xml_diff>